<commit_message>
Update HSM Mick(müssen noch zusammengefügt werden).pptx
</commit_message>
<xml_diff>
--- a/HSM Mick(müssen noch zusammengefügt werden).pptx
+++ b/HSM Mick(müssen noch zusammengefügt werden).pptx
@@ -271,7 +271,7 @@
               <a:pPr>
                 <a:defRPr/>
               </a:pPr>
-              <a:t>13.01.22</a:t>
+              <a:t>14.01.2022</a:t>
             </a:fld>
             <a:endParaRPr lang="de-DE"/>
           </a:p>
@@ -346,7 +346,7 @@
               <a:pPr>
                 <a:defRPr/>
               </a:pPr>
-              <a:t>‹#›</a:t>
+              <a:t>‹Nr.›</a:t>
             </a:fld>
             <a:endParaRPr lang="de-DE"/>
           </a:p>
@@ -454,7 +454,7 @@
               <a:pPr>
                 <a:defRPr/>
               </a:pPr>
-              <a:t>13.01.22</a:t>
+              <a:t>14.01.2022</a:t>
             </a:fld>
             <a:endParaRPr lang="de-DE"/>
           </a:p>
@@ -624,7 +624,7 @@
               <a:pPr>
                 <a:defRPr/>
               </a:pPr>
-              <a:t>‹#›</a:t>
+              <a:t>‹Nr.›</a:t>
             </a:fld>
             <a:endParaRPr lang="de-DE"/>
           </a:p>
@@ -1773,7 +1773,7 @@
                 </a:tabLst>
                 <a:defRPr/>
               </a:pPr>
-              <a:t>13. Januar 2022</a:t>
+              <a:t>14. Januar 2022</a:t>
             </a:fld>
             <a:r>
               <a:rPr lang="de-DE" sz="800" dirty="0">
@@ -1791,7 +1791,7 @@
                 </a:tabLst>
                 <a:defRPr/>
               </a:pPr>
-              <a:t>‹#›</a:t>
+              <a:t>‹Nr.›</a:t>
             </a:fld>
             <a:endParaRPr lang="de-DE" sz="800" dirty="0">
               <a:latin typeface="Verdana" pitchFamily="34" charset="0"/>
@@ -2130,7 +2130,7 @@
                 </a:tabLst>
                 <a:defRPr/>
               </a:pPr>
-              <a:t>13. Januar 2022</a:t>
+              <a:t>14. Januar 2022</a:t>
             </a:fld>
             <a:r>
               <a:rPr lang="de-DE" sz="800" dirty="0">
@@ -2148,7 +2148,7 @@
                 </a:tabLst>
                 <a:defRPr/>
               </a:pPr>
-              <a:t>‹#›</a:t>
+              <a:t>‹Nr.›</a:t>
             </a:fld>
             <a:endParaRPr lang="de-DE" sz="800" dirty="0">
               <a:latin typeface="Verdana" pitchFamily="34" charset="0"/>
@@ -2516,7 +2516,7 @@
                 </a:tabLst>
                 <a:defRPr/>
               </a:pPr>
-              <a:t>13. Januar 2022</a:t>
+              <a:t>14. Januar 2022</a:t>
             </a:fld>
             <a:r>
               <a:rPr lang="de-DE" sz="800" dirty="0">
@@ -2534,7 +2534,7 @@
                 </a:tabLst>
                 <a:defRPr/>
               </a:pPr>
-              <a:t>‹#›</a:t>
+              <a:t>‹Nr.›</a:t>
             </a:fld>
             <a:endParaRPr lang="de-DE" sz="800" dirty="0">
               <a:latin typeface="Verdana" pitchFamily="34" charset="0"/>
@@ -3290,7 +3290,7 @@
               <a:pPr>
                 <a:defRPr/>
               </a:pPr>
-              <a:t>13. Januar 2022</a:t>
+              <a:t>14. Januar 2022</a:t>
             </a:fld>
             <a:endParaRPr lang="de-DE" dirty="0"/>
           </a:p>
@@ -3417,7 +3417,7 @@
               <a:pPr>
                 <a:defRPr/>
               </a:pPr>
-              <a:t>‹#›</a:t>
+              <a:t>‹Nr.›</a:t>
             </a:fld>
             <a:endParaRPr lang="de-DE"/>
           </a:p>
@@ -4058,7 +4058,7 @@
           <a:p>
             <a:r>
               <a:rPr lang="de-DE" sz="1600" dirty="0"/>
-              <a:t>Besonders Angreifbar:</a:t>
+              <a:t>Angreifbar:</a:t>
             </a:r>
           </a:p>
           <a:p>
@@ -4070,7 +4070,7 @@
           <a:p>
             <a:r>
               <a:rPr lang="de-DE" sz="1600" dirty="0"/>
-              <a:t>- Ungeschützte Datenleitungen mit Videosignalen (HDMI, DVI etc.)</a:t>
+              <a:t>- Ungeschützte Datenleitungen und Videosignale (HDMI, DVI etc.).</a:t>
             </a:r>
           </a:p>
           <a:p>
@@ -4079,7 +4079,7 @@
           <a:p>
             <a:r>
               <a:rPr lang="de-DE" sz="1600" dirty="0"/>
-              <a:t>- Stromschwankungen auch Analysierbar in Kombination mittels SPA oder DPA</a:t>
+              <a:t>- Stromschwankungen auch Analysierbar in Kombination mittels SPA oder DPA.</a:t>
             </a:r>
           </a:p>
           <a:p>
@@ -4088,7 +4088,7 @@
           <a:p>
             <a:r>
               <a:rPr lang="de-DE" sz="1600" dirty="0"/>
-              <a:t>- Direkt unverschlüsselt am Endgerät mitlesen</a:t>
+              <a:t>- Direkt unverschlüsselt am Endgerät mitlesen.</a:t>
             </a:r>
           </a:p>
         </p:txBody>
@@ -4773,7 +4773,7 @@
           <a:p>
             <a:r>
               <a:rPr lang="de-DE" dirty="0"/>
-              <a:t>Benutzer Speicher von einem Prozess kann also Rückschlüsse auf den anderen ermöglichen.</a:t>
+              <a:t>Benutzter Speicher von einem Prozess kann also Rückschlüsse auf den anderen ermöglichen.</a:t>
             </a:r>
           </a:p>
           <a:p>
@@ -4831,7 +4831,7 @@
           <p:nvPr/>
         </p:nvPicPr>
         <p:blipFill>
-          <a:blip r:embed="rId2">
+          <a:blip r:embed="rId2" cstate="print">
             <a:extLst>
               <a:ext uri="{28A0092B-C50C-407E-A947-70E740481C1C}">
                 <a14:useLocalDpi xmlns:a14="http://schemas.microsoft.com/office/drawing/2010/main" val="0"/>
@@ -5503,7 +5503,7 @@
           <p:nvPr/>
         </p:nvPicPr>
         <p:blipFill>
-          <a:blip r:embed="rId2">
+          <a:blip r:embed="rId2" cstate="print">
             <a:extLst>
               <a:ext uri="{28A0092B-C50C-407E-A947-70E740481C1C}">
                 <a14:useLocalDpi xmlns:a14="http://schemas.microsoft.com/office/drawing/2010/main" val="0"/>
@@ -6135,7 +6135,7 @@
           <p:nvPr/>
         </p:nvPicPr>
         <p:blipFill>
-          <a:blip r:embed="rId2">
+          <a:blip r:embed="rId2" cstate="print">
             <a:extLst>
               <a:ext uri="{28A0092B-C50C-407E-A947-70E740481C1C}">
                 <a14:useLocalDpi xmlns:a14="http://schemas.microsoft.com/office/drawing/2010/main" val="0"/>
@@ -6226,15 +6226,7 @@
           <a:p>
             <a:r>
               <a:rPr lang="de-DE" sz="1600" dirty="0"/>
-              <a:t>Divisionen und Multiplikationen als Ziel aufgrund deren </a:t>
-            </a:r>
-            <a:r>
-              <a:rPr lang="de-DE" sz="1600" dirty="0" err="1"/>
-              <a:t>optimierung</a:t>
-            </a:r>
-            <a:r>
-              <a:rPr lang="de-DE" sz="1600" dirty="0"/>
-              <a:t>.</a:t>
+              <a:t>Divisionen und Multiplikationen als Ziel aufgrund deren Optimierung.</a:t>
             </a:r>
           </a:p>
           <a:p>
@@ -8062,7 +8054,7 @@
           <p:nvPr/>
         </p:nvPicPr>
         <p:blipFill>
-          <a:blip r:embed="rId3">
+          <a:blip r:embed="rId3" cstate="print">
             <a:extLst>
               <a:ext uri="{28A0092B-C50C-407E-A947-70E740481C1C}">
                 <a14:useLocalDpi xmlns:a14="http://schemas.microsoft.com/office/drawing/2010/main" val="0"/>
@@ -11804,7 +11796,7 @@
                   <a:schemeClr val="tx2"/>
                 </a:solidFill>
               </a:rPr>
-              <a:t>Analyse des Energieverbrauchs während der Ausführung.</a:t>
+              <a:t>Analyse des Energieverbrauches während der Ausführung.</a:t>
             </a:r>
           </a:p>
           <a:p>
@@ -12794,7 +12786,7 @@
             </a:r>
             <a:r>
               <a:rPr lang="de-DE" dirty="0"/>
-              <a:t> kann eindeutig zeigen welche Operation zu welchem Zeitpunkt ausgeführt wurde</a:t>
+              <a:t> kann eindeutig zeigen welche Operation zu welchem Zeitpunkt ausgeführt wurde.</a:t>
             </a:r>
           </a:p>
         </p:txBody>
@@ -13876,7 +13868,7 @@
         <p:spPr>
           <a:xfrm>
             <a:off x="466648" y="2492896"/>
-            <a:ext cx="8281816" cy="2677656"/>
+            <a:ext cx="8281816" cy="3754874"/>
           </a:xfrm>
           <a:prstGeom prst="rect">
             <a:avLst/>
@@ -13891,44 +13883,50 @@
           <a:p>
             <a:r>
               <a:rPr lang="de-DE" sz="2000" dirty="0"/>
-              <a:t>Wird in Kombination eine SPA oder DPA genutzt.</a:t>
-            </a:r>
+              <a:t>Die Quelle der Information ist hier:</a:t>
+            </a:r>
+          </a:p>
+          <a:p>
+            <a:endParaRPr lang="de-DE" sz="2000" dirty="0"/>
           </a:p>
           <a:p>
             <a:r>
               <a:rPr lang="de-DE" sz="2000" dirty="0"/>
-              <a:t>Die Quelle der Information ist hier aber:</a:t>
+              <a:t>- Spulenfiepen einzelner Komponenten.</a:t>
             </a:r>
           </a:p>
           <a:p>
             <a:endParaRPr lang="de-DE" sz="2000" dirty="0"/>
           </a:p>
           <a:p>
+            <a:r>
+              <a:rPr lang="de-DE" sz="2000" dirty="0"/>
+              <a:t>- Vibration von Bauelementen.</a:t>
+            </a:r>
+          </a:p>
+          <a:p>
+            <a:endParaRPr lang="de-DE" sz="2000" dirty="0"/>
+          </a:p>
+          <a:p>
+            <a:r>
+              <a:rPr lang="de-DE" sz="2000" dirty="0"/>
+              <a:t>Aber auch triviale Quellen wie Druckergeräusche oder ähnliches sind möglich.</a:t>
+            </a:r>
+          </a:p>
+          <a:p>
+            <a:endParaRPr lang="de-DE" sz="2000" dirty="0"/>
+          </a:p>
+          <a:p>
+            <a:r>
+              <a:rPr lang="de-DE" sz="2000" dirty="0"/>
+              <a:t>Wird in Kombination mit einer SPA oder DPA genutzt.</a:t>
+            </a:r>
+          </a:p>
+          <a:p>
+            <a:endParaRPr lang="de-DE" sz="2000" dirty="0"/>
+          </a:p>
+          <a:p>
             <a:endParaRPr lang="de-DE" dirty="0"/>
-          </a:p>
-          <a:p>
-            <a:r>
-              <a:rPr lang="de-DE" dirty="0"/>
-              <a:t>- Spulenfiepen einzelner Komponenten.</a:t>
-            </a:r>
-          </a:p>
-          <a:p>
-            <a:endParaRPr lang="de-DE" dirty="0"/>
-          </a:p>
-          <a:p>
-            <a:r>
-              <a:rPr lang="de-DE" dirty="0"/>
-              <a:t>- Vibration von Bauelementen.</a:t>
-            </a:r>
-          </a:p>
-          <a:p>
-            <a:endParaRPr lang="de-DE" dirty="0"/>
-          </a:p>
-          <a:p>
-            <a:r>
-              <a:rPr lang="de-DE" dirty="0"/>
-              <a:t>Aber auch triviale Quellen wie Druckergeräusche oder ähnliches sind möglich.</a:t>
-            </a:r>
           </a:p>
         </p:txBody>
       </p:sp>
@@ -13993,15 +13991,33 @@
                                   </p:childTnLst>
                                 </p:cTn>
                               </p:par>
+                            </p:childTnLst>
+                          </p:cTn>
+                        </p:par>
+                      </p:childTnLst>
+                    </p:cTn>
+                  </p:par>
+                  <p:par>
+                    <p:cTn id="7" fill="hold">
+                      <p:stCondLst>
+                        <p:cond delay="indefinite"/>
+                      </p:stCondLst>
+                      <p:childTnLst>
+                        <p:par>
+                          <p:cTn id="8" fill="hold">
+                            <p:stCondLst>
+                              <p:cond delay="0"/>
+                            </p:stCondLst>
+                            <p:childTnLst>
                               <p:par>
-                                <p:cTn id="7" presetID="1" presetClass="entr" presetSubtype="0" fill="hold" nodeType="withEffect">
+                                <p:cTn id="9" presetID="1" presetClass="entr" presetSubtype="0" fill="hold" nodeType="clickEffect">
                                   <p:stCondLst>
                                     <p:cond delay="0"/>
                                   </p:stCondLst>
                                   <p:childTnLst>
                                     <p:set>
                                       <p:cBhvr>
-                                        <p:cTn id="8" dur="1" fill="hold">
+                                        <p:cTn id="10" dur="1" fill="hold">
                                           <p:stCondLst>
                                             <p:cond delay="0"/>
                                           </p:stCondLst>
@@ -14009,7 +14025,7 @@
                                         <p:tgtEl>
                                           <p:spTgt spid="5">
                                             <p:txEl>
-                                              <p:pRg st="1" end="1"/>
+                                              <p:pRg st="2" end="2"/>
                                             </p:txEl>
                                           </p:spTgt>
                                         </p:tgtEl>
@@ -14031,26 +14047,26 @@
                     </p:cTn>
                   </p:par>
                   <p:par>
-                    <p:cTn id="9" fill="hold">
+                    <p:cTn id="11" fill="hold">
                       <p:stCondLst>
                         <p:cond delay="indefinite"/>
                       </p:stCondLst>
                       <p:childTnLst>
                         <p:par>
-                          <p:cTn id="10" fill="hold">
+                          <p:cTn id="12" fill="hold">
                             <p:stCondLst>
                               <p:cond delay="0"/>
                             </p:stCondLst>
                             <p:childTnLst>
                               <p:par>
-                                <p:cTn id="11" presetID="1" presetClass="entr" presetSubtype="0" fill="hold" nodeType="clickEffect">
+                                <p:cTn id="13" presetID="1" presetClass="entr" presetSubtype="0" fill="hold" nodeType="clickEffect">
                                   <p:stCondLst>
                                     <p:cond delay="0"/>
                                   </p:stCondLst>
                                   <p:childTnLst>
                                     <p:set>
                                       <p:cBhvr>
-                                        <p:cTn id="12" dur="1" fill="hold">
+                                        <p:cTn id="14" dur="1" fill="hold">
                                           <p:stCondLst>
                                             <p:cond delay="0"/>
                                           </p:stCondLst>
@@ -14080,26 +14096,26 @@
                     </p:cTn>
                   </p:par>
                   <p:par>
-                    <p:cTn id="13" fill="hold">
+                    <p:cTn id="15" fill="hold">
                       <p:stCondLst>
                         <p:cond delay="indefinite"/>
                       </p:stCondLst>
                       <p:childTnLst>
                         <p:par>
-                          <p:cTn id="14" fill="hold">
+                          <p:cTn id="16" fill="hold">
                             <p:stCondLst>
                               <p:cond delay="0"/>
                             </p:stCondLst>
                             <p:childTnLst>
                               <p:par>
-                                <p:cTn id="15" presetID="1" presetClass="entr" presetSubtype="0" fill="hold" nodeType="clickEffect">
+                                <p:cTn id="17" presetID="1" presetClass="entr" presetSubtype="0" fill="hold" nodeType="clickEffect">
                                   <p:stCondLst>
                                     <p:cond delay="0"/>
                                   </p:stCondLst>
                                   <p:childTnLst>
                                     <p:set>
                                       <p:cBhvr>
-                                        <p:cTn id="16" dur="1" fill="hold">
+                                        <p:cTn id="18" dur="1" fill="hold">
                                           <p:stCondLst>
                                             <p:cond delay="0"/>
                                           </p:stCondLst>
@@ -14129,26 +14145,26 @@
                     </p:cTn>
                   </p:par>
                   <p:par>
-                    <p:cTn id="17" fill="hold">
+                    <p:cTn id="19" fill="hold">
                       <p:stCondLst>
                         <p:cond delay="indefinite"/>
                       </p:stCondLst>
                       <p:childTnLst>
                         <p:par>
-                          <p:cTn id="18" fill="hold">
+                          <p:cTn id="20" fill="hold">
                             <p:stCondLst>
                               <p:cond delay="0"/>
                             </p:stCondLst>
                             <p:childTnLst>
                               <p:par>
-                                <p:cTn id="19" presetID="1" presetClass="entr" presetSubtype="0" fill="hold" nodeType="clickEffect">
+                                <p:cTn id="21" presetID="1" presetClass="entr" presetSubtype="0" fill="hold" nodeType="clickEffect">
                                   <p:stCondLst>
                                     <p:cond delay="0"/>
                                   </p:stCondLst>
                                   <p:childTnLst>
                                     <p:set>
                                       <p:cBhvr>
-                                        <p:cTn id="20" dur="1" fill="hold">
+                                        <p:cTn id="22" dur="1" fill="hold">
                                           <p:stCondLst>
                                             <p:cond delay="0"/>
                                           </p:stCondLst>

</xml_diff>